<commit_message>
added tutorial questions to Session 9: Help.
</commit_message>
<xml_diff>
--- a/Session_9/getting_help.pptx
+++ b/Session_9/getting_help.pptx
@@ -5,10 +5,10 @@
     <p:sldMasterId id="2147484536" r:id="rId1"/>
   </p:sldMasterIdLst>
   <p:notesMasterIdLst>
-    <p:notesMasterId r:id="rId16"/>
+    <p:notesMasterId r:id="rId20"/>
   </p:notesMasterIdLst>
   <p:handoutMasterIdLst>
-    <p:handoutMasterId r:id="rId17"/>
+    <p:handoutMasterId r:id="rId21"/>
   </p:handoutMasterIdLst>
   <p:sldIdLst>
     <p:sldId id="256" r:id="rId2"/>
@@ -25,6 +25,10 @@
     <p:sldId id="267" r:id="rId13"/>
     <p:sldId id="268" r:id="rId14"/>
     <p:sldId id="269" r:id="rId15"/>
+    <p:sldId id="274" r:id="rId16"/>
+    <p:sldId id="271" r:id="rId17"/>
+    <p:sldId id="272" r:id="rId18"/>
+    <p:sldId id="273" r:id="rId19"/>
   </p:sldIdLst>
   <p:sldSz cx="9144000" cy="6858000" type="screen4x3"/>
   <p:notesSz cx="9144000" cy="6858000"/>
@@ -125,7 +129,7 @@
   </p:defaultTextStyle>
   <p:extLst>
     <p:ext uri="{EFAFB233-063F-42B5-8137-9DF3F51BA10A}">
-      <p15:sldGuideLst xmlns:p15="http://schemas.microsoft.com/office/powerpoint/2012/main">
+      <p15:sldGuideLst xmlns="" xmlns:p15="http://schemas.microsoft.com/office/powerpoint/2012/main">
         <p15:guide id="1" orient="horz" pos="2160">
           <p15:clr>
             <a:srgbClr val="A4A3A4"/>
@@ -224,7 +228,7 @@
           <a:p>
             <a:fld id="{66734AEB-C3F1-452F-8A11-92E10FFE9BEE}" type="datetimeFigureOut">
               <a:rPr lang="en-ZA" smtClean="0"/>
-              <a:t>2014-05-20</a:t>
+              <a:t>2014/06/09</a:t>
             </a:fld>
             <a:endParaRPr lang="en-ZA"/>
           </a:p>
@@ -389,7 +393,7 @@
           <a:p>
             <a:fld id="{BD309B68-0014-4D29-ABC1-A81882B82D75}" type="datetimeFigureOut">
               <a:rPr lang="en-ZA" smtClean="0"/>
-              <a:t>2014-05-20</a:t>
+              <a:t>2014/06/09</a:t>
             </a:fld>
             <a:endParaRPr lang="en-ZA"/>
           </a:p>
@@ -824,7 +828,7 @@
             <a:fld id="{54AB02A5-4FE5-49D9-9E24-09F23B90C450}" type="datetimeFigureOut">
               <a:rPr lang="en-US" smtClean="0"/>
               <a:pPr/>
-              <a:t>5/20/2014</a:t>
+              <a:t>6/9/2014</a:t>
             </a:fld>
             <a:endParaRPr lang="en-US" dirty="0"/>
           </a:p>
@@ -1558,7 +1562,7 @@
             <a:fld id="{C3F416CD-67A3-4CF0-A210-F6AF31AC147F}" type="datetimeFigureOut">
               <a:rPr lang="en-US" smtClean="0"/>
               <a:pPr/>
-              <a:t>5/20/2014</a:t>
+              <a:t>6/9/2014</a:t>
             </a:fld>
             <a:endParaRPr lang="en-US" dirty="0"/>
           </a:p>
@@ -3751,7 +3755,7 @@
             <a:fld id="{D012B20A-81E8-C944-A0DE-B0DB94049484}" type="datetimeFigureOut">
               <a:rPr lang="en-US" smtClean="0"/>
               <a:pPr/>
-              <a:t>5/20/2014</a:t>
+              <a:t>6/9/2014</a:t>
             </a:fld>
             <a:endParaRPr lang="en-US" dirty="0"/>
           </a:p>
@@ -6285,6 +6289,939 @@
 </p:sld>
 </file>
 
+<file path=ppt/slides/slide15.xml><?xml version="1.0" encoding="utf-8"?>
+<p:sld xmlns:a="http://schemas.openxmlformats.org/drawingml/2006/main" xmlns:r="http://schemas.openxmlformats.org/officeDocument/2006/relationships" xmlns:p="http://schemas.openxmlformats.org/presentationml/2006/main">
+  <p:cSld>
+    <p:spTree>
+      <p:nvGrpSpPr>
+        <p:cNvPr id="1" name=""/>
+        <p:cNvGrpSpPr/>
+        <p:nvPr/>
+      </p:nvGrpSpPr>
+      <p:grpSpPr>
+        <a:xfrm>
+          <a:off x="0" y="0"/>
+          <a:ext cx="0" cy="0"/>
+          <a:chOff x="0" y="0"/>
+          <a:chExt cx="0" cy="0"/>
+        </a:xfrm>
+      </p:grpSpPr>
+      <p:sp>
+        <p:nvSpPr>
+          <p:cNvPr id="2" name="Title 1"/>
+          <p:cNvSpPr>
+            <a:spLocks noGrp="1"/>
+          </p:cNvSpPr>
+          <p:nvPr>
+            <p:ph type="title"/>
+          </p:nvPr>
+        </p:nvSpPr>
+        <p:spPr/>
+        <p:txBody>
+          <a:bodyPr>
+            <a:normAutofit/>
+          </a:bodyPr>
+          <a:lstStyle/>
+          <a:p>
+            <a:r>
+              <a:rPr lang="en-US" dirty="0" smtClean="0"/>
+              <a:t>Vignettes</a:t>
+            </a:r>
+            <a:endParaRPr lang="en-US" dirty="0"/>
+          </a:p>
+        </p:txBody>
+      </p:sp>
+      <p:sp>
+        <p:nvSpPr>
+          <p:cNvPr id="3" name="Content Placeholder 2"/>
+          <p:cNvSpPr>
+            <a:spLocks noGrp="1"/>
+          </p:cNvSpPr>
+          <p:nvPr>
+            <p:ph idx="1"/>
+          </p:nvPr>
+        </p:nvSpPr>
+        <p:spPr/>
+        <p:txBody>
+          <a:bodyPr>
+            <a:normAutofit lnSpcReduction="10000"/>
+          </a:bodyPr>
+          <a:lstStyle/>
+          <a:p>
+            <a:pPr marL="0" indent="0">
+              <a:buNone/>
+            </a:pPr>
+            <a:r>
+              <a:rPr lang="en-US" dirty="0" smtClean="0"/>
+              <a:t>Some packages come with vignettes. They are essentially additionally documentations.</a:t>
+            </a:r>
+          </a:p>
+          <a:p>
+            <a:pPr marL="0" indent="0">
+              <a:buNone/>
+            </a:pPr>
+            <a:endParaRPr lang="en-US" dirty="0" smtClean="0"/>
+          </a:p>
+          <a:p>
+            <a:pPr marL="0" indent="0">
+              <a:buNone/>
+            </a:pPr>
+            <a:r>
+              <a:rPr lang="en-US" dirty="0" smtClean="0"/>
+              <a:t>If we install the package “ape”,</a:t>
+            </a:r>
+          </a:p>
+          <a:p>
+            <a:pPr marL="0" indent="0">
+              <a:buNone/>
+            </a:pPr>
+            <a:r>
+              <a:rPr lang="en-US" dirty="0" smtClean="0">
+                <a:latin typeface="Courier New" pitchFamily="49" charset="0"/>
+                <a:cs typeface="Courier New" pitchFamily="49" charset="0"/>
+              </a:rPr>
+              <a:t>Library(ape)</a:t>
+            </a:r>
+          </a:p>
+          <a:p>
+            <a:pPr marL="0" indent="0">
+              <a:buNone/>
+            </a:pPr>
+            <a:r>
+              <a:rPr lang="en-US" dirty="0" smtClean="0"/>
+              <a:t>Then enter:</a:t>
+            </a:r>
+          </a:p>
+          <a:p>
+            <a:pPr marL="0" indent="0">
+              <a:buNone/>
+            </a:pPr>
+            <a:r>
+              <a:rPr lang="en-US" dirty="0">
+                <a:latin typeface="Courier New" pitchFamily="49" charset="0"/>
+                <a:cs typeface="Courier New" pitchFamily="49" charset="0"/>
+              </a:rPr>
+              <a:t>vignette</a:t>
+            </a:r>
+            <a:r>
+              <a:rPr lang="en-US" dirty="0" smtClean="0">
+                <a:latin typeface="Courier New" pitchFamily="49" charset="0"/>
+                <a:cs typeface="Courier New" pitchFamily="49" charset="0"/>
+              </a:rPr>
+              <a:t>()</a:t>
+            </a:r>
+          </a:p>
+          <a:p>
+            <a:pPr marL="0" indent="0">
+              <a:buNone/>
+            </a:pPr>
+            <a:r>
+              <a:rPr lang="en-US" dirty="0" smtClean="0"/>
+              <a:t>To see a list of </a:t>
+            </a:r>
+            <a:r>
+              <a:rPr lang="en-US" dirty="0"/>
+              <a:t>all available </a:t>
+            </a:r>
+            <a:r>
+              <a:rPr lang="en-US" dirty="0" smtClean="0"/>
+              <a:t>vignettes on your computer. To view one, enter:</a:t>
+            </a:r>
+          </a:p>
+          <a:p>
+            <a:pPr marL="0" indent="0">
+              <a:buNone/>
+            </a:pPr>
+            <a:r>
+              <a:rPr lang="en-US" dirty="0">
+                <a:latin typeface="Courier New" pitchFamily="49" charset="0"/>
+                <a:cs typeface="Courier New" pitchFamily="49" charset="0"/>
+              </a:rPr>
+              <a:t>vignette("</a:t>
+            </a:r>
+            <a:r>
+              <a:rPr lang="en-US" dirty="0" err="1">
+                <a:latin typeface="Courier New" pitchFamily="49" charset="0"/>
+                <a:cs typeface="Courier New" pitchFamily="49" charset="0"/>
+              </a:rPr>
+              <a:t>MoranI</a:t>
+            </a:r>
+            <a:r>
+              <a:rPr lang="en-US" dirty="0">
+                <a:latin typeface="Courier New" pitchFamily="49" charset="0"/>
+                <a:cs typeface="Courier New" pitchFamily="49" charset="0"/>
+              </a:rPr>
+              <a:t>", package="ape")</a:t>
+            </a:r>
+          </a:p>
+        </p:txBody>
+      </p:sp>
+    </p:spTree>
+    <p:extLst>
+      <p:ext uri="{BB962C8B-B14F-4D97-AF65-F5344CB8AC3E}">
+        <p14:creationId xmlns:p14="http://schemas.microsoft.com/office/powerpoint/2010/main" val="3010099730"/>
+      </p:ext>
+    </p:extLst>
+  </p:cSld>
+  <p:clrMapOvr>
+    <a:masterClrMapping/>
+  </p:clrMapOvr>
+</p:sld>
+</file>
+
+<file path=ppt/slides/slide16.xml><?xml version="1.0" encoding="utf-8"?>
+<p:sld xmlns:a="http://schemas.openxmlformats.org/drawingml/2006/main" xmlns:r="http://schemas.openxmlformats.org/officeDocument/2006/relationships" xmlns:p="http://schemas.openxmlformats.org/presentationml/2006/main">
+  <p:cSld>
+    <p:spTree>
+      <p:nvGrpSpPr>
+        <p:cNvPr id="1" name=""/>
+        <p:cNvGrpSpPr/>
+        <p:nvPr/>
+      </p:nvGrpSpPr>
+      <p:grpSpPr>
+        <a:xfrm>
+          <a:off x="0" y="0"/>
+          <a:ext cx="0" cy="0"/>
+          <a:chOff x="0" y="0"/>
+          <a:chExt cx="0" cy="0"/>
+        </a:xfrm>
+      </p:grpSpPr>
+      <p:sp>
+        <p:nvSpPr>
+          <p:cNvPr id="2" name="Title 1"/>
+          <p:cNvSpPr>
+            <a:spLocks noGrp="1"/>
+          </p:cNvSpPr>
+          <p:nvPr>
+            <p:ph type="title"/>
+          </p:nvPr>
+        </p:nvSpPr>
+        <p:spPr>
+          <a:xfrm>
+            <a:off x="457200" y="132588"/>
+            <a:ext cx="8229600" cy="1143000"/>
+          </a:xfrm>
+        </p:spPr>
+        <p:txBody>
+          <a:bodyPr/>
+          <a:lstStyle/>
+          <a:p>
+            <a:r>
+              <a:rPr lang="en-US" dirty="0" smtClean="0"/>
+              <a:t>Tutorial</a:t>
+            </a:r>
+            <a:endParaRPr lang="en-US" dirty="0"/>
+          </a:p>
+        </p:txBody>
+      </p:sp>
+      <p:sp>
+        <p:nvSpPr>
+          <p:cNvPr id="3" name="Content Placeholder 2"/>
+          <p:cNvSpPr>
+            <a:spLocks noGrp="1"/>
+          </p:cNvSpPr>
+          <p:nvPr>
+            <p:ph idx="1"/>
+          </p:nvPr>
+        </p:nvSpPr>
+        <p:spPr>
+          <a:xfrm>
+            <a:off x="457200" y="1199985"/>
+            <a:ext cx="8229600" cy="5330024"/>
+          </a:xfrm>
+        </p:spPr>
+        <p:txBody>
+          <a:bodyPr>
+            <a:normAutofit/>
+          </a:bodyPr>
+          <a:lstStyle/>
+          <a:p>
+            <a:pPr marL="0" indent="0">
+              <a:buNone/>
+            </a:pPr>
+            <a:r>
+              <a:rPr lang="en-US" dirty="0" smtClean="0"/>
+              <a:t>1) 	Install </a:t>
+            </a:r>
+            <a:r>
+              <a:rPr lang="en-US" dirty="0"/>
+              <a:t>the following packages</a:t>
+            </a:r>
+            <a:r>
+              <a:rPr lang="en-US" dirty="0" smtClean="0"/>
+              <a:t>:</a:t>
+            </a:r>
+          </a:p>
+          <a:p>
+            <a:r>
+              <a:rPr lang="en-US" dirty="0" smtClean="0"/>
+              <a:t>ggplot2
+foreign
+</a:t>
+            </a:r>
+            <a:r>
+              <a:rPr lang="en-US" dirty="0" err="1" smtClean="0"/>
+              <a:t>Hmisc</a:t>
+            </a:r>
+            <a:r>
+              <a:rPr lang="en-US" dirty="0" smtClean="0"/>
+              <a:t>
+</a:t>
+            </a:r>
+            <a:r>
+              <a:rPr lang="en-US" dirty="0" err="1" smtClean="0"/>
+              <a:t>plyr</a:t>
+            </a:r>
+            <a:r>
+              <a:rPr lang="en-US" dirty="0" smtClean="0"/>
+              <a:t>
+</a:t>
+            </a:r>
+            <a:r>
+              <a:rPr lang="en-US" dirty="0" err="1" smtClean="0"/>
+              <a:t>colorspace</a:t>
+            </a:r>
+            <a:r>
+              <a:rPr lang="en-US" dirty="0" smtClean="0"/>
+              <a:t>
+</a:t>
+            </a:r>
+            <a:r>
+              <a:rPr lang="en-US" dirty="0" err="1" smtClean="0"/>
+              <a:t>lubridate</a:t>
+            </a:r>
+            <a:r>
+              <a:rPr lang="en-US" dirty="0" smtClean="0"/>
+              <a:t>
+ape
+</a:t>
+            </a:r>
+            <a:r>
+              <a:rPr lang="en-US" dirty="0" err="1" smtClean="0"/>
+              <a:t>knitr</a:t>
+            </a:r>
+            <a:endParaRPr lang="en-US" dirty="0" smtClean="0"/>
+          </a:p>
+          <a:p>
+            <a:r>
+              <a:rPr lang="en-US" dirty="0" smtClean="0"/>
+              <a:t>MASS</a:t>
+            </a:r>
+          </a:p>
+        </p:txBody>
+      </p:sp>
+    </p:spTree>
+    <p:extLst>
+      <p:ext uri="{BB962C8B-B14F-4D97-AF65-F5344CB8AC3E}">
+        <p14:creationId xmlns:p14="http://schemas.microsoft.com/office/powerpoint/2010/main" val="3554118213"/>
+      </p:ext>
+    </p:extLst>
+  </p:cSld>
+  <p:clrMapOvr>
+    <a:masterClrMapping/>
+  </p:clrMapOvr>
+</p:sld>
+</file>
+
+<file path=ppt/slides/slide17.xml><?xml version="1.0" encoding="utf-8"?>
+<p:sld xmlns:a="http://schemas.openxmlformats.org/drawingml/2006/main" xmlns:r="http://schemas.openxmlformats.org/officeDocument/2006/relationships" xmlns:p="http://schemas.openxmlformats.org/presentationml/2006/main">
+  <p:cSld>
+    <p:spTree>
+      <p:nvGrpSpPr>
+        <p:cNvPr id="1" name=""/>
+        <p:cNvGrpSpPr/>
+        <p:nvPr/>
+      </p:nvGrpSpPr>
+      <p:grpSpPr>
+        <a:xfrm>
+          <a:off x="0" y="0"/>
+          <a:ext cx="0" cy="0"/>
+          <a:chOff x="0" y="0"/>
+          <a:chExt cx="0" cy="0"/>
+        </a:xfrm>
+      </p:grpSpPr>
+      <p:sp>
+        <p:nvSpPr>
+          <p:cNvPr id="2" name="Title 1"/>
+          <p:cNvSpPr>
+            <a:spLocks noGrp="1"/>
+          </p:cNvSpPr>
+          <p:nvPr>
+            <p:ph type="title"/>
+          </p:nvPr>
+        </p:nvSpPr>
+        <p:spPr/>
+        <p:txBody>
+          <a:bodyPr/>
+          <a:lstStyle/>
+          <a:p>
+            <a:endParaRPr lang="en-US" dirty="0"/>
+          </a:p>
+        </p:txBody>
+      </p:sp>
+      <p:sp>
+        <p:nvSpPr>
+          <p:cNvPr id="3" name="Content Placeholder 2"/>
+          <p:cNvSpPr>
+            <a:spLocks noGrp="1"/>
+          </p:cNvSpPr>
+          <p:nvPr>
+            <p:ph idx="1"/>
+          </p:nvPr>
+        </p:nvSpPr>
+        <p:spPr/>
+        <p:txBody>
+          <a:bodyPr>
+            <a:normAutofit fontScale="70000" lnSpcReduction="20000"/>
+          </a:bodyPr>
+          <a:lstStyle/>
+          <a:p>
+            <a:pPr marL="0" indent="0">
+              <a:buNone/>
+            </a:pPr>
+            <a:r>
+              <a:rPr lang="en-US" dirty="0" smtClean="0"/>
+              <a:t>2) Try find help for ggplot2.</a:t>
+            </a:r>
+          </a:p>
+          <a:p>
+            <a:pPr marL="393192" lvl="1" indent="0">
+              <a:buNone/>
+            </a:pPr>
+            <a:r>
+              <a:rPr lang="en-US" dirty="0" smtClean="0"/>
+              <a:t>2.1 If you cannot find help in R, where else can you look?</a:t>
+            </a:r>
+          </a:p>
+          <a:p>
+            <a:pPr marL="393192" lvl="1" indent="0">
+              <a:buNone/>
+            </a:pPr>
+            <a:r>
+              <a:rPr lang="en-US" dirty="0" smtClean="0"/>
+              <a:t>2.2 Find help for ggplot2.</a:t>
+            </a:r>
+          </a:p>
+          <a:p>
+            <a:pPr marL="393192" lvl="1" indent="0">
+              <a:buNone/>
+            </a:pPr>
+            <a:r>
+              <a:rPr lang="en-US" dirty="0" smtClean="0"/>
+              <a:t>2.3 Find the documentation for ggplot2.</a:t>
+            </a:r>
+          </a:p>
+          <a:p>
+            <a:pPr marL="0" indent="0">
+              <a:buNone/>
+            </a:pPr>
+            <a:r>
+              <a:rPr lang="en-US" dirty="0" smtClean="0"/>
+              <a:t>3) When was the first version of </a:t>
+            </a:r>
+            <a:r>
+              <a:rPr lang="en-US" dirty="0"/>
+              <a:t>foreign available on CRAN</a:t>
+            </a:r>
+            <a:r>
+              <a:rPr lang="en-US" dirty="0" smtClean="0"/>
+              <a:t>?</a:t>
+            </a:r>
+          </a:p>
+          <a:p>
+            <a:pPr marL="393192" lvl="1" indent="0">
+              <a:buNone/>
+            </a:pPr>
+            <a:r>
+              <a:rPr lang="en-US" dirty="0" smtClean="0"/>
+              <a:t>3.1 What is the Title in the help for foreign?</a:t>
+            </a:r>
+          </a:p>
+          <a:p>
+            <a:pPr marL="0" indent="0">
+              <a:buNone/>
+            </a:pPr>
+            <a:r>
+              <a:rPr lang="en-US" dirty="0" smtClean="0"/>
+              <a:t>4) For “</a:t>
+            </a:r>
+            <a:r>
+              <a:rPr lang="en-US" dirty="0" err="1"/>
+              <a:t>Hmisc</a:t>
+            </a:r>
+            <a:r>
+              <a:rPr lang="en-US" dirty="0"/>
+              <a:t> </a:t>
+            </a:r>
+            <a:r>
+              <a:rPr lang="en-US" dirty="0" smtClean="0"/>
+              <a:t>“, what is the description from the help?</a:t>
+            </a:r>
+          </a:p>
+          <a:p>
+            <a:pPr marL="0" indent="0">
+              <a:buNone/>
+            </a:pPr>
+            <a:r>
+              <a:rPr lang="en-US" dirty="0" smtClean="0"/>
+              <a:t>5) From the description in the help, what pattern does </a:t>
+            </a:r>
+            <a:r>
+              <a:rPr lang="en-US" dirty="0" err="1" smtClean="0"/>
+              <a:t>plyr</a:t>
+            </a:r>
+            <a:r>
+              <a:rPr lang="en-US" dirty="0" smtClean="0"/>
+              <a:t> make use of? And, what does this mean?</a:t>
+            </a:r>
+          </a:p>
+          <a:p>
+            <a:pPr marL="0" indent="0">
+              <a:buNone/>
+            </a:pPr>
+            <a:r>
+              <a:rPr lang="en-US" dirty="0" smtClean="0"/>
+              <a:t>6) Besides RGB, give two other sets of </a:t>
+            </a:r>
+            <a:r>
+              <a:rPr lang="en-US" dirty="0" err="1" smtClean="0"/>
+              <a:t>colours</a:t>
+            </a:r>
+            <a:r>
+              <a:rPr lang="en-US" dirty="0" smtClean="0"/>
+              <a:t> from </a:t>
+            </a:r>
+            <a:r>
+              <a:rPr lang="en-US" dirty="0" err="1" smtClean="0"/>
+              <a:t>colorspace</a:t>
+            </a:r>
+            <a:r>
+              <a:rPr lang="en-US" dirty="0" smtClean="0"/>
+              <a:t>.</a:t>
+            </a:r>
+          </a:p>
+          <a:p>
+            <a:pPr marL="0" indent="0">
+              <a:buNone/>
+            </a:pPr>
+            <a:r>
+              <a:rPr lang="en-US" dirty="0" smtClean="0"/>
+              <a:t>7) What does the package “</a:t>
+            </a:r>
+            <a:r>
+              <a:rPr lang="en-US" dirty="0" err="1" smtClean="0"/>
+              <a:t>lubridate</a:t>
+            </a:r>
+            <a:r>
+              <a:rPr lang="en-US" dirty="0" smtClean="0"/>
+              <a:t>” deal with?</a:t>
+            </a:r>
+          </a:p>
+          <a:p>
+            <a:pPr marL="0" indent="0">
+              <a:buNone/>
+            </a:pPr>
+            <a:r>
+              <a:rPr lang="en-US" dirty="0" smtClean="0"/>
+              <a:t>8) From the help section, what does “ape” stand for?</a:t>
+            </a:r>
+          </a:p>
+          <a:p>
+            <a:pPr marL="0" indent="0">
+              <a:buNone/>
+            </a:pPr>
+            <a:r>
+              <a:rPr lang="en-US" dirty="0" smtClean="0"/>
+              <a:t>9) From the help section, what is </a:t>
+            </a:r>
+            <a:r>
+              <a:rPr lang="en-US" dirty="0" err="1" smtClean="0"/>
+              <a:t>knitr</a:t>
+            </a:r>
+            <a:r>
+              <a:rPr lang="en-US" dirty="0" smtClean="0"/>
+              <a:t> an alternative to? And, how would you explain what it can be used for to someone else?</a:t>
+            </a:r>
+          </a:p>
+          <a:p>
+            <a:pPr marL="0" indent="0">
+              <a:buNone/>
+            </a:pPr>
+            <a:r>
+              <a:rPr lang="en-US" dirty="0" smtClean="0"/>
+              <a:t>10)From the help section, give two datasets, and two functions from the package “MASS”.</a:t>
+            </a:r>
+          </a:p>
+          <a:p>
+            <a:pPr marL="0" indent="0">
+              <a:buNone/>
+            </a:pPr>
+            <a:endParaRPr lang="en-US" dirty="0" smtClean="0"/>
+          </a:p>
+        </p:txBody>
+      </p:sp>
+    </p:spTree>
+    <p:extLst>
+      <p:ext uri="{BB962C8B-B14F-4D97-AF65-F5344CB8AC3E}">
+        <p14:creationId xmlns:p14="http://schemas.microsoft.com/office/powerpoint/2010/main" val="1136407799"/>
+      </p:ext>
+    </p:extLst>
+  </p:cSld>
+  <p:clrMapOvr>
+    <a:masterClrMapping/>
+  </p:clrMapOvr>
+</p:sld>
+</file>
+
+<file path=ppt/slides/slide18.xml><?xml version="1.0" encoding="utf-8"?>
+<p:sld xmlns:a="http://schemas.openxmlformats.org/drawingml/2006/main" xmlns:r="http://schemas.openxmlformats.org/officeDocument/2006/relationships" xmlns:p="http://schemas.openxmlformats.org/presentationml/2006/main">
+  <p:cSld>
+    <p:spTree>
+      <p:nvGrpSpPr>
+        <p:cNvPr id="1" name=""/>
+        <p:cNvGrpSpPr/>
+        <p:nvPr/>
+      </p:nvGrpSpPr>
+      <p:grpSpPr>
+        <a:xfrm>
+          <a:off x="0" y="0"/>
+          <a:ext cx="0" cy="0"/>
+          <a:chOff x="0" y="0"/>
+          <a:chExt cx="0" cy="0"/>
+        </a:xfrm>
+      </p:grpSpPr>
+      <p:sp>
+        <p:nvSpPr>
+          <p:cNvPr id="2" name="Title 1"/>
+          <p:cNvSpPr>
+            <a:spLocks noGrp="1"/>
+          </p:cNvSpPr>
+          <p:nvPr>
+            <p:ph type="title"/>
+          </p:nvPr>
+        </p:nvSpPr>
+        <p:spPr/>
+        <p:txBody>
+          <a:bodyPr/>
+          <a:lstStyle/>
+          <a:p>
+            <a:r>
+              <a:rPr lang="en-US" dirty="0" smtClean="0"/>
+              <a:t>answers</a:t>
+            </a:r>
+            <a:endParaRPr lang="en-US" dirty="0"/>
+          </a:p>
+        </p:txBody>
+      </p:sp>
+      <p:sp>
+        <p:nvSpPr>
+          <p:cNvPr id="3" name="Content Placeholder 2"/>
+          <p:cNvSpPr>
+            <a:spLocks noGrp="1"/>
+          </p:cNvSpPr>
+          <p:nvPr>
+            <p:ph idx="1"/>
+          </p:nvPr>
+        </p:nvSpPr>
+        <p:spPr/>
+        <p:txBody>
+          <a:bodyPr>
+            <a:normAutofit fontScale="62500" lnSpcReduction="20000"/>
+          </a:bodyPr>
+          <a:lstStyle/>
+          <a:p>
+            <a:pPr marL="0" indent="0">
+              <a:buNone/>
+            </a:pPr>
+            <a:r>
+              <a:rPr lang="en-US" dirty="0" smtClean="0"/>
+              <a:t>1) </a:t>
+            </a:r>
+          </a:p>
+          <a:p>
+            <a:pPr marL="0" indent="0">
+              <a:buNone/>
+            </a:pPr>
+            <a:r>
+              <a:rPr lang="en-US" dirty="0" smtClean="0"/>
+              <a:t>2</a:t>
+            </a:r>
+            <a:r>
+              <a:rPr lang="en-US" dirty="0"/>
+              <a:t>) http://ggplot2.org/ </a:t>
+            </a:r>
+            <a:r>
+              <a:rPr lang="en-US" dirty="0" smtClean="0"/>
+              <a:t>and http</a:t>
+            </a:r>
+            <a:r>
+              <a:rPr lang="en-US" dirty="0"/>
+              <a:t>://docs.ggplot2.org/current/</a:t>
+            </a:r>
+            <a:endParaRPr lang="en-US" dirty="0" smtClean="0"/>
+          </a:p>
+          <a:p>
+            <a:pPr marL="0" indent="0">
+              <a:buNone/>
+            </a:pPr>
+            <a:r>
+              <a:rPr lang="en-US" dirty="0"/>
+              <a:t>3) </a:t>
+            </a:r>
+            <a:r>
+              <a:rPr lang="en-US" dirty="0" smtClean="0"/>
+              <a:t>17-Dec-1999</a:t>
+            </a:r>
+          </a:p>
+          <a:p>
+            <a:pPr marL="0" indent="0">
+              <a:buNone/>
+            </a:pPr>
+            <a:r>
+              <a:rPr lang="en-US" dirty="0" smtClean="0"/>
+              <a:t>3.1) </a:t>
+            </a:r>
+            <a:r>
+              <a:rPr lang="en-US" dirty="0"/>
+              <a:t>from: library(help="foreign")</a:t>
+            </a:r>
+          </a:p>
+          <a:p>
+            <a:pPr marL="0" indent="0">
+              <a:buNone/>
+            </a:pPr>
+            <a:r>
+              <a:rPr lang="en-US" dirty="0" smtClean="0"/>
+              <a:t>“Read </a:t>
+            </a:r>
+            <a:r>
+              <a:rPr lang="en-US" dirty="0"/>
+              <a:t>Data Stored by Minitab, S, SAS, SPSS, </a:t>
+            </a:r>
+            <a:r>
+              <a:rPr lang="en-US" dirty="0" err="1"/>
+              <a:t>Stata</a:t>
+            </a:r>
+            <a:r>
+              <a:rPr lang="en-US" dirty="0"/>
+              <a:t>, </a:t>
+            </a:r>
+            <a:r>
+              <a:rPr lang="en-US" dirty="0" err="1"/>
+              <a:t>Systat</a:t>
+            </a:r>
+            <a:r>
+              <a:rPr lang="en-US" dirty="0"/>
+              <a:t>, </a:t>
+            </a:r>
+            <a:r>
+              <a:rPr lang="en-US" dirty="0" err="1"/>
+              <a:t>Weka</a:t>
+            </a:r>
+            <a:r>
+              <a:rPr lang="en-US" dirty="0"/>
+              <a:t>, dBase, ...”</a:t>
+            </a:r>
+            <a:endParaRPr lang="en-US" dirty="0" smtClean="0"/>
+          </a:p>
+          <a:p>
+            <a:pPr marL="0" indent="0">
+              <a:buNone/>
+            </a:pPr>
+            <a:r>
+              <a:rPr lang="en-US" dirty="0" smtClean="0"/>
+              <a:t>4</a:t>
+            </a:r>
+            <a:r>
+              <a:rPr lang="en-US" dirty="0"/>
+              <a:t>) </a:t>
+            </a:r>
+            <a:r>
+              <a:rPr lang="en-US" dirty="0" smtClean="0"/>
+              <a:t>from: library(help="</a:t>
+            </a:r>
+            <a:r>
+              <a:rPr lang="en-US" dirty="0" err="1" smtClean="0"/>
+              <a:t>Hmisc</a:t>
+            </a:r>
+            <a:r>
+              <a:rPr lang="en-US" dirty="0" smtClean="0"/>
+              <a:t>")</a:t>
+            </a:r>
+          </a:p>
+          <a:p>
+            <a:pPr marL="0" indent="0">
+              <a:buNone/>
+            </a:pPr>
+            <a:r>
+              <a:rPr lang="en-US" dirty="0" smtClean="0"/>
+              <a:t>“The </a:t>
+            </a:r>
+            <a:r>
+              <a:rPr lang="en-US" dirty="0" err="1"/>
+              <a:t>Hmisc</a:t>
+            </a:r>
+            <a:r>
+              <a:rPr lang="en-US" dirty="0"/>
+              <a:t> package contains many functions useful for data analysis, high-level graphics, </a:t>
+            </a:r>
+            <a:r>
+              <a:rPr lang="en-US" dirty="0" smtClean="0"/>
+              <a:t>utility operations</a:t>
+            </a:r>
+            <a:r>
+              <a:rPr lang="en-US" dirty="0"/>
+              <a:t>, functions for computing sample size and power, importing datasets, imputing missing values</a:t>
+            </a:r>
+            <a:r>
+              <a:rPr lang="en-US" dirty="0" smtClean="0"/>
+              <a:t>, advanced </a:t>
+            </a:r>
+            <a:r>
+              <a:rPr lang="en-US" dirty="0"/>
+              <a:t>table making, variable clustering, character string manipulation, conversion of R objects to </a:t>
+            </a:r>
+            <a:r>
+              <a:rPr lang="en-US" dirty="0" err="1" smtClean="0"/>
+              <a:t>LaTeX</a:t>
+            </a:r>
+            <a:r>
+              <a:rPr lang="en-US" dirty="0" smtClean="0"/>
+              <a:t> code</a:t>
+            </a:r>
+            <a:r>
+              <a:rPr lang="en-US" dirty="0"/>
+              <a:t>, and recoding </a:t>
+            </a:r>
+            <a:r>
+              <a:rPr lang="en-US" dirty="0" smtClean="0"/>
+              <a:t>variables.”</a:t>
+            </a:r>
+          </a:p>
+          <a:p>
+            <a:pPr marL="0" indent="0">
+              <a:buNone/>
+            </a:pPr>
+            <a:r>
+              <a:rPr lang="en-US" dirty="0"/>
+              <a:t>5) the split-apply-combine pattern in R</a:t>
+            </a:r>
+            <a:r>
+              <a:rPr lang="en-US" dirty="0" smtClean="0"/>
+              <a:t>.</a:t>
+            </a:r>
+          </a:p>
+          <a:p>
+            <a:pPr marL="0" indent="0">
+              <a:buNone/>
+            </a:pPr>
+            <a:r>
+              <a:rPr lang="en-US" dirty="0" smtClean="0"/>
+              <a:t>6) HLS, HSV, LAB, LUV.</a:t>
+            </a:r>
+          </a:p>
+          <a:p>
+            <a:pPr marL="0" indent="0">
+              <a:buNone/>
+            </a:pPr>
+            <a:r>
+              <a:rPr lang="en-US" dirty="0"/>
+              <a:t>7) Time. “</a:t>
+            </a:r>
+            <a:r>
+              <a:rPr lang="en-US" dirty="0" err="1"/>
+              <a:t>Lubridate</a:t>
+            </a:r>
+            <a:r>
+              <a:rPr lang="en-US" dirty="0"/>
+              <a:t> provides tools that make it easier to parse and manipulate dates</a:t>
+            </a:r>
+            <a:r>
+              <a:rPr lang="en-US" dirty="0" smtClean="0"/>
+              <a:t>.“</a:t>
+            </a:r>
+          </a:p>
+          <a:p>
+            <a:pPr marL="0" indent="0">
+              <a:buNone/>
+            </a:pPr>
+            <a:r>
+              <a:rPr lang="en-US" dirty="0"/>
+              <a:t>8) Analyses of </a:t>
+            </a:r>
+            <a:r>
+              <a:rPr lang="en-US" dirty="0" err="1"/>
+              <a:t>Phylogenetics</a:t>
+            </a:r>
+            <a:r>
+              <a:rPr lang="en-US" dirty="0"/>
+              <a:t> and </a:t>
+            </a:r>
+            <a:r>
+              <a:rPr lang="en-US" dirty="0" smtClean="0"/>
+              <a:t>Evolution.</a:t>
+            </a:r>
+          </a:p>
+          <a:p>
+            <a:pPr marL="0" indent="0">
+              <a:buNone/>
+            </a:pPr>
+            <a:r>
+              <a:rPr lang="en-US" dirty="0" smtClean="0"/>
+              <a:t>9</a:t>
+            </a:r>
+            <a:r>
+              <a:rPr lang="en-US" dirty="0"/>
+              <a:t>) alternative tool to </a:t>
+            </a:r>
+            <a:r>
+              <a:rPr lang="en-US" dirty="0" err="1" smtClean="0"/>
+              <a:t>Sweave</a:t>
+            </a:r>
+            <a:r>
+              <a:rPr lang="en-US" dirty="0"/>
+              <a:t>. “The </a:t>
+            </a:r>
+            <a:r>
+              <a:rPr lang="en-US" dirty="0" err="1"/>
+              <a:t>knitr</a:t>
+            </a:r>
+            <a:r>
+              <a:rPr lang="en-US" dirty="0"/>
+              <a:t> package was designed to be a transparent engine for dynamic report generation with </a:t>
+            </a:r>
+            <a:r>
+              <a:rPr lang="en-US" dirty="0" smtClean="0"/>
+              <a:t>R”</a:t>
+            </a:r>
+          </a:p>
+          <a:p>
+            <a:pPr marL="0" indent="0">
+              <a:buNone/>
+            </a:pPr>
+            <a:r>
+              <a:rPr lang="en-US" dirty="0"/>
+              <a:t>10) library(help="MASS")</a:t>
+            </a:r>
+          </a:p>
+          <a:p>
+            <a:endParaRPr lang="en-US" dirty="0"/>
+          </a:p>
+        </p:txBody>
+      </p:sp>
+    </p:spTree>
+    <p:extLst>
+      <p:ext uri="{BB962C8B-B14F-4D97-AF65-F5344CB8AC3E}">
+        <p14:creationId xmlns:p14="http://schemas.microsoft.com/office/powerpoint/2010/main" val="1218754088"/>
+      </p:ext>
+    </p:extLst>
+  </p:cSld>
+  <p:clrMapOvr>
+    <a:masterClrMapping/>
+  </p:clrMapOvr>
+</p:sld>
+</file>
+
 <file path=ppt/slides/slide2.xml><?xml version="1.0" encoding="utf-8"?>
 <p:sld xmlns:a="http://schemas.openxmlformats.org/drawingml/2006/main" xmlns:r="http://schemas.openxmlformats.org/officeDocument/2006/relationships" xmlns:p="http://schemas.openxmlformats.org/presentationml/2006/main" showMasterSp="0">
   <p:cSld>
@@ -8131,23 +9068,7 @@
                   <a:srgbClr val="0070C0"/>
                 </a:solidFill>
               </a:rPr>
-              <a:t>The </a:t>
-            </a:r>
-            <a:r>
-              <a:rPr lang="en-ZA" dirty="0" smtClean="0">
-                <a:solidFill>
-                  <a:srgbClr val="0070C0"/>
-                </a:solidFill>
-              </a:rPr>
-              <a:t>arguments </a:t>
-            </a:r>
-            <a:r>
-              <a:rPr lang="en-ZA" dirty="0" smtClean="0">
-                <a:solidFill>
-                  <a:srgbClr val="0070C0"/>
-                </a:solidFill>
-              </a:rPr>
-              <a:t>of </a:t>
+              <a:t>The arguments of </a:t>
             </a:r>
             <a:r>
               <a:rPr lang="en-ZA" sz="2000" b="1" dirty="0">

</xml_diff>